<commit_message>
pptx updated and edited
</commit_message>
<xml_diff>
--- a/Smart Car Parking System.pptx
+++ b/Smart Car Parking System.pptx
@@ -4164,7 +4164,7 @@
           <a:p>
             <a:fld id="{FE5B4EDC-59C0-49C7-8ADA-5A781B329E02}" type="datetimeFigureOut">
               <a:rPr lang="en-US"/>
-              <a:t>15-Nov-20</a:t>
+              <a:t>10-Dec-20</a:t>
             </a:fld>
             <a:endParaRPr dirty="0"/>
           </a:p>
@@ -4329,7 +4329,7 @@
           <a:p>
             <a:fld id="{F2D8D46A-B586-417D-BFBD-8C8FE0AAF762}" type="datetimeFigureOut">
               <a:rPr lang="en-US"/>
-              <a:t>15-Nov-20</a:t>
+              <a:t>10-Dec-20</a:t>
             </a:fld>
             <a:endParaRPr dirty="0"/>
           </a:p>
@@ -5431,7 +5431,7 @@
           <a:p>
             <a:fld id="{F0DFD029-FB74-4578-B929-F66AA97659CA}" type="datetimeFigureOut">
               <a:rPr lang="en-US"/>
-              <a:t>15-Nov-20</a:t>
+              <a:t>10-Dec-20</a:t>
             </a:fld>
             <a:endParaRPr dirty="0"/>
           </a:p>
@@ -5629,7 +5629,7 @@
           <a:p>
             <a:fld id="{F0DFD029-FB74-4578-B929-F66AA97659CA}" type="datetimeFigureOut">
               <a:rPr lang="en-US"/>
-              <a:t>15-Nov-20</a:t>
+              <a:t>10-Dec-20</a:t>
             </a:fld>
             <a:endParaRPr dirty="0"/>
           </a:p>
@@ -5837,7 +5837,7 @@
           <a:p>
             <a:fld id="{F0DFD029-FB74-4578-B929-F66AA97659CA}" type="datetimeFigureOut">
               <a:rPr lang="en-US"/>
-              <a:t>15-Nov-20</a:t>
+              <a:t>10-Dec-20</a:t>
             </a:fld>
             <a:endParaRPr dirty="0"/>
           </a:p>
@@ -6035,7 +6035,7 @@
           <a:p>
             <a:fld id="{F0DFD029-FB74-4578-B929-F66AA97659CA}" type="datetimeFigureOut">
               <a:rPr lang="en-US"/>
-              <a:t>15-Nov-20</a:t>
+              <a:t>10-Dec-20</a:t>
             </a:fld>
             <a:endParaRPr dirty="0"/>
           </a:p>
@@ -6467,7 +6467,7 @@
           <a:p>
             <a:fld id="{F0DFD029-FB74-4578-B929-F66AA97659CA}" type="datetimeFigureOut">
               <a:rPr lang="en-US"/>
-              <a:t>15-Nov-20</a:t>
+              <a:t>10-Dec-20</a:t>
             </a:fld>
             <a:endParaRPr dirty="0"/>
           </a:p>
@@ -6771,7 +6771,7 @@
           <a:p>
             <a:fld id="{F0DFD029-FB74-4578-B929-F66AA97659CA}" type="datetimeFigureOut">
               <a:rPr lang="en-US"/>
-              <a:t>15-Nov-20</a:t>
+              <a:t>10-Dec-20</a:t>
             </a:fld>
             <a:endParaRPr dirty="0"/>
           </a:p>
@@ -7227,7 +7227,7 @@
           <a:p>
             <a:fld id="{F0DFD029-FB74-4578-B929-F66AA97659CA}" type="datetimeFigureOut">
               <a:rPr lang="en-US"/>
-              <a:t>15-Nov-20</a:t>
+              <a:t>10-Dec-20</a:t>
             </a:fld>
             <a:endParaRPr dirty="0"/>
           </a:p>
@@ -7357,7 +7357,7 @@
           <a:p>
             <a:fld id="{F0DFD029-FB74-4578-B929-F66AA97659CA}" type="datetimeFigureOut">
               <a:rPr lang="en-US"/>
-              <a:t>15-Nov-20</a:t>
+              <a:t>10-Dec-20</a:t>
             </a:fld>
             <a:endParaRPr dirty="0"/>
           </a:p>
@@ -7464,7 +7464,7 @@
           <a:p>
             <a:fld id="{F0DFD029-FB74-4578-B929-F66AA97659CA}" type="datetimeFigureOut">
               <a:rPr lang="en-US"/>
-              <a:t>15-Nov-20</a:t>
+              <a:t>10-Dec-20</a:t>
             </a:fld>
             <a:endParaRPr dirty="0"/>
           </a:p>
@@ -7763,7 +7763,7 @@
           <a:p>
             <a:fld id="{F0DFD029-FB74-4578-B929-F66AA97659CA}" type="datetimeFigureOut">
               <a:rPr lang="en-US"/>
-              <a:t>15-Nov-20</a:t>
+              <a:t>10-Dec-20</a:t>
             </a:fld>
             <a:endParaRPr dirty="0"/>
           </a:p>
@@ -8051,7 +8051,7 @@
           <a:p>
             <a:fld id="{F0DFD029-FB74-4578-B929-F66AA97659CA}" type="datetimeFigureOut">
               <a:rPr lang="en-US"/>
-              <a:t>15-Nov-20</a:t>
+              <a:t>10-Dec-20</a:t>
             </a:fld>
             <a:endParaRPr dirty="0"/>
           </a:p>
@@ -8674,7 +8674,7 @@
             <a:fld id="{F0DFD029-FB74-4578-B929-F66AA97659CA}" type="datetimeFigureOut">
               <a:rPr lang="en-US"/>
               <a:pPr/>
-              <a:t>15-Nov-20</a:t>
+              <a:t>10-Dec-20</a:t>
             </a:fld>
             <a:endParaRPr dirty="0"/>
           </a:p>
@@ -9777,12 +9777,12 @@
         <p:spPr>
           <a:xfrm>
             <a:off x="1434328" y="2243078"/>
-            <a:ext cx="8393884" cy="2860592"/>
+            <a:ext cx="8393884" cy="3852922"/>
           </a:xfrm>
         </p:spPr>
         <p:txBody>
           <a:bodyPr>
-            <a:normAutofit lnSpcReduction="10000"/>
+            <a:normAutofit/>
           </a:bodyPr>
           <a:lstStyle/>
           <a:p>
@@ -9799,6 +9799,16 @@
               <a:latin typeface="Calibri Light" panose="020F0302020204030204" pitchFamily="34" charset="0"/>
               <a:cs typeface="Calibri Light" panose="020F0302020204030204" pitchFamily="34" charset="0"/>
             </a:endParaRPr>
+          </a:p>
+          <a:p>
+            <a:pPr marL="1066693" lvl="1" indent="-457200" algn="just">
+              <a:buFont typeface="Arial" panose="020B0604020202020204" pitchFamily="34" charset="0"/>
+              <a:buChar char="•"/>
+            </a:pPr>
+            <a:r>
+              <a:rPr lang="en-US" dirty="0"/>
+              <a:t>Automated</a:t>
+            </a:r>
           </a:p>
           <a:p>
             <a:pPr marL="1066693" lvl="1" indent="-457200" algn="just">
@@ -9924,7 +9934,9 @@
           </a:xfrm>
         </p:spPr>
         <p:txBody>
-          <a:bodyPr/>
+          <a:bodyPr>
+            <a:normAutofit lnSpcReduction="10000"/>
+          </a:bodyPr>
           <a:lstStyle/>
           <a:p>
             <a:r>
@@ -9946,7 +9958,7 @@
             </a:pPr>
             <a:r>
               <a:rPr lang="en-US" dirty="0"/>
-              <a:t>Parking spot of any industrial area.</a:t>
+              <a:t>Parking spot of any industrial area</a:t>
             </a:r>
           </a:p>
           <a:p>
@@ -9998,6 +10010,23 @@
             <a:r>
               <a:rPr lang="en-US" dirty="0"/>
               <a:t>Mass Parking Complex</a:t>
+            </a:r>
+          </a:p>
+          <a:p>
+            <a:pPr marL="1066693" lvl="1" indent="-457200">
+              <a:buFont typeface="Arial" panose="020B0604020202020204" pitchFamily="34" charset="0"/>
+              <a:buChar char="•"/>
+            </a:pPr>
+            <a:endParaRPr lang="en-US" dirty="0"/>
+          </a:p>
+          <a:p>
+            <a:pPr marL="1066693" lvl="1" indent="-457200">
+              <a:buFont typeface="Arial" panose="020B0604020202020204" pitchFamily="34" charset="0"/>
+              <a:buChar char="•"/>
+            </a:pPr>
+            <a:r>
+              <a:rPr lang="en-US" dirty="0"/>
+              <a:t>Residential Areas</a:t>
             </a:r>
           </a:p>
         </p:txBody>

</xml_diff>